<commit_message>
Module 6 Completed. with links
</commit_message>
<xml_diff>
--- a/Complimentary Course Content/Module6/Lessons/Module6_Lesson4 Introduction to IoT Hub.pptx
+++ b/Complimentary Course Content/Module6/Lessons/Module6_Lesson4 Introduction to IoT Hub.pptx
@@ -161,7 +161,7 @@
       </p14:sectionLst>
     </p:ext>
     <p:ext uri="{EFAFB233-063F-42B5-8137-9DF3F51BA10A}">
-      <p15:sldGuideLst xmlns:p15="http://schemas.microsoft.com/office/powerpoint/2012/main" xmlns="">
+      <p15:sldGuideLst xmlns="" xmlns:p15="http://schemas.microsoft.com/office/powerpoint/2012/main">
         <p15:guide id="1" orient="horz" pos="2137" userDrawn="1">
           <p15:clr>
             <a:srgbClr val="A4A3A4"/>
@@ -175,7 +175,7 @@
       </p15:sldGuideLst>
     </p:ext>
     <p:ext uri="{2D200454-40CA-4A62-9FC3-DE9A4176ACB9}">
-      <p15:notesGuideLst xmlns:p15="http://schemas.microsoft.com/office/powerpoint/2012/main" xmlns=""/>
+      <p15:notesGuideLst xmlns="" xmlns:p15="http://schemas.microsoft.com/office/powerpoint/2012/main"/>
     </p:ext>
   </p:extLst>
 </p:presentation>
@@ -271,7 +271,7 @@
             <a:fld id="{30A74B2F-3EEF-410A-B738-5B66A46A3256}" type="datetimeFigureOut">
               <a:rPr lang="en-US" smtClean="0"/>
               <a:pPr/>
-              <a:t>7/7/16</a:t>
+              <a:t>7/12/16</a:t>
             </a:fld>
             <a:endParaRPr lang="en-US"/>
           </a:p>
@@ -438,7 +438,7 @@
             <a:fld id="{2E5CA586-3557-4985-BCD4-35EF5AC8B4A4}" type="datetimeFigureOut">
               <a:rPr lang="en-US" smtClean="0"/>
               <a:pPr/>
-              <a:t>7/7/16</a:t>
+              <a:t>7/12/16</a:t>
             </a:fld>
             <a:endParaRPr lang="en-US"/>
           </a:p>
@@ -2429,7 +2429,59 @@
             <a:pPr marL="0" indent="0">
               <a:buNone/>
             </a:pPr>
-            <a:endParaRPr lang="en-US" dirty="0"/>
+            <a:r>
+              <a:rPr lang="en-US" b="1" dirty="0" smtClean="0"/>
+              <a:t>Notes:</a:t>
+            </a:r>
+          </a:p>
+          <a:p>
+            <a:pPr marL="171450" indent="-171450">
+              <a:buFont typeface="Arial"/>
+              <a:buChar char="•"/>
+            </a:pPr>
+            <a:r>
+              <a:rPr lang="en-US" b="0" dirty="0" smtClean="0"/>
+              <a:t>The Module 6 Lesson</a:t>
+            </a:r>
+            <a:r>
+              <a:rPr lang="en-US" b="0" baseline="0" dirty="0" smtClean="0"/>
+              <a:t> 4 Lab should be completed at this time:</a:t>
+            </a:r>
+          </a:p>
+          <a:p>
+            <a:pPr marL="628650" lvl="1" indent="-171450">
+              <a:buFont typeface="Arial"/>
+              <a:buChar char="•"/>
+            </a:pPr>
+            <a:r>
+              <a:rPr lang="en-US" b="0" dirty="0" smtClean="0"/>
+              <a:t>https://</a:t>
+            </a:r>
+            <a:r>
+              <a:rPr lang="en-US" b="0" dirty="0" err="1" smtClean="0"/>
+              <a:t>github.com</a:t>
+            </a:r>
+            <a:r>
+              <a:rPr lang="en-US" b="0" dirty="0" smtClean="0"/>
+              <a:t>/</a:t>
+            </a:r>
+            <a:r>
+              <a:rPr lang="en-US" b="0" dirty="0" err="1" smtClean="0"/>
+              <a:t>MSFTImagine</a:t>
+            </a:r>
+            <a:r>
+              <a:rPr lang="en-US" b="0" dirty="0" smtClean="0"/>
+              <a:t>/</a:t>
+            </a:r>
+            <a:r>
+              <a:rPr lang="en-US" b="0" dirty="0" err="1" smtClean="0"/>
+              <a:t>computerscience</a:t>
+            </a:r>
+            <a:r>
+              <a:rPr lang="en-US" b="0" dirty="0" smtClean="0"/>
+              <a:t>/tree/master/Complimentary%20Course%20Content/Module6/Labs</a:t>
+            </a:r>
+            <a:endParaRPr lang="en-US" b="0" dirty="0"/>
           </a:p>
         </p:txBody>
       </p:sp>
@@ -12012,7 +12064,7 @@
                 <a:latin typeface="Segoe UI"/>
               </a:rPr>
               <a:pPr/>
-              <a:t>7/7/16</a:t>
+              <a:t>7/12/16</a:t>
             </a:fld>
             <a:endParaRPr lang="en-US">
               <a:solidFill>
@@ -12217,7 +12269,7 @@
                 <a:latin typeface="Segoe UI"/>
               </a:rPr>
               <a:pPr/>
-              <a:t>7/7/16</a:t>
+              <a:t>7/12/16</a:t>
             </a:fld>
             <a:endParaRPr lang="en-US">
               <a:solidFill>
@@ -12515,7 +12567,7 @@
                 <a:latin typeface="Segoe UI"/>
               </a:rPr>
               <a:pPr/>
-              <a:t>7/7/16</a:t>
+              <a:t>7/12/16</a:t>
             </a:fld>
             <a:endParaRPr lang="en-US">
               <a:solidFill>
@@ -12859,7 +12911,7 @@
                 <a:latin typeface="Segoe UI"/>
               </a:rPr>
               <a:pPr/>
-              <a:t>7/7/16</a:t>
+              <a:t>7/12/16</a:t>
             </a:fld>
             <a:endParaRPr lang="en-US">
               <a:solidFill>
@@ -13234,7 +13286,7 @@
                 <a:latin typeface="Segoe UI"/>
               </a:rPr>
               <a:pPr/>
-              <a:t>7/7/16</a:t>
+              <a:t>7/12/16</a:t>
             </a:fld>
             <a:endParaRPr lang="en-US">
               <a:solidFill>
@@ -14545,7 +14597,7 @@
                 <a:latin typeface="Segoe UI"/>
               </a:rPr>
               <a:pPr/>
-              <a:t>7/7/16</a:t>
+              <a:t>7/12/16</a:t>
             </a:fld>
             <a:endParaRPr lang="en-US">
               <a:solidFill>
@@ -14946,7 +14998,7 @@
                 <a:latin typeface="Segoe UI"/>
               </a:rPr>
               <a:pPr/>
-              <a:t>7/7/16</a:t>
+              <a:t>7/12/16</a:t>
             </a:fld>
             <a:endParaRPr lang="en-US">
               <a:solidFill>
@@ -15100,7 +15152,7 @@
                 <a:latin typeface="Segoe UI"/>
               </a:rPr>
               <a:pPr/>
-              <a:t>7/7/16</a:t>
+              <a:t>7/12/16</a:t>
             </a:fld>
             <a:endParaRPr lang="en-US">
               <a:solidFill>
@@ -15232,7 +15284,7 @@
                 <a:latin typeface="Segoe UI"/>
               </a:rPr>
               <a:pPr/>
-              <a:t>7/7/16</a:t>
+              <a:t>7/12/16</a:t>
             </a:fld>
             <a:endParaRPr lang="en-US">
               <a:solidFill>
@@ -15544,7 +15596,7 @@
                 <a:latin typeface="Segoe UI"/>
               </a:rPr>
               <a:pPr/>
-              <a:t>7/7/16</a:t>
+              <a:t>7/12/16</a:t>
             </a:fld>
             <a:endParaRPr lang="en-US">
               <a:solidFill>
@@ -15833,7 +15885,7 @@
                 <a:latin typeface="Segoe UI"/>
               </a:rPr>
               <a:pPr/>
-              <a:t>7/7/16</a:t>
+              <a:t>7/12/16</a:t>
             </a:fld>
             <a:endParaRPr lang="en-US">
               <a:solidFill>
@@ -16038,7 +16090,7 @@
                 <a:latin typeface="Segoe UI"/>
               </a:rPr>
               <a:pPr/>
-              <a:t>7/7/16</a:t>
+              <a:t>7/12/16</a:t>
             </a:fld>
             <a:endParaRPr lang="en-US">
               <a:solidFill>
@@ -16253,7 +16305,7 @@
                 <a:latin typeface="Segoe UI"/>
               </a:rPr>
               <a:pPr/>
-              <a:t>7/7/16</a:t>
+              <a:t>7/12/16</a:t>
             </a:fld>
             <a:endParaRPr lang="en-US">
               <a:solidFill>
@@ -16496,7 +16548,7 @@
                 <a:latin typeface="Segoe UI"/>
               </a:rPr>
               <a:pPr/>
-              <a:t>7/7/16</a:t>
+              <a:t>7/12/16</a:t>
             </a:fld>
             <a:endParaRPr lang="en-US">
               <a:solidFill>
@@ -16701,7 +16753,7 @@
                 <a:latin typeface="Segoe UI"/>
               </a:rPr>
               <a:pPr/>
-              <a:t>7/7/16</a:t>
+              <a:t>7/12/16</a:t>
             </a:fld>
             <a:endParaRPr lang="en-US">
               <a:solidFill>
@@ -17456,7 +17508,7 @@
                 <a:latin typeface="Segoe UI"/>
               </a:rPr>
               <a:pPr/>
-              <a:t>7/7/16</a:t>
+              <a:t>7/12/16</a:t>
             </a:fld>
             <a:endParaRPr lang="en-US">
               <a:solidFill>
@@ -17800,7 +17852,7 @@
                 <a:latin typeface="Segoe UI"/>
               </a:rPr>
               <a:pPr/>
-              <a:t>7/7/16</a:t>
+              <a:t>7/12/16</a:t>
             </a:fld>
             <a:endParaRPr lang="en-US">
               <a:solidFill>
@@ -18175,7 +18227,7 @@
                 <a:latin typeface="Segoe UI"/>
               </a:rPr>
               <a:pPr/>
-              <a:t>7/7/16</a:t>
+              <a:t>7/12/16</a:t>
             </a:fld>
             <a:endParaRPr lang="en-US">
               <a:solidFill>
@@ -19119,7 +19171,7 @@
                 <a:latin typeface="Segoe UI"/>
               </a:rPr>
               <a:pPr/>
-              <a:t>7/7/16</a:t>
+              <a:t>7/12/16</a:t>
             </a:fld>
             <a:endParaRPr lang="en-US">
               <a:solidFill>
@@ -19520,7 +19572,7 @@
                 <a:latin typeface="Segoe UI"/>
               </a:rPr>
               <a:pPr/>
-              <a:t>7/7/16</a:t>
+              <a:t>7/12/16</a:t>
             </a:fld>
             <a:endParaRPr lang="en-US">
               <a:solidFill>
@@ -19674,7 +19726,7 @@
                 <a:latin typeface="Segoe UI"/>
               </a:rPr>
               <a:pPr/>
-              <a:t>7/7/16</a:t>
+              <a:t>7/12/16</a:t>
             </a:fld>
             <a:endParaRPr lang="en-US">
               <a:solidFill>
@@ -19806,7 +19858,7 @@
                 <a:latin typeface="Segoe UI"/>
               </a:rPr>
               <a:pPr/>
-              <a:t>7/7/16</a:t>
+              <a:t>7/12/16</a:t>
             </a:fld>
             <a:endParaRPr lang="en-US">
               <a:solidFill>
@@ -20681,7 +20733,7 @@
                 <a:latin typeface="Segoe UI"/>
               </a:rPr>
               <a:pPr/>
-              <a:t>7/7/16</a:t>
+              <a:t>7/12/16</a:t>
             </a:fld>
             <a:endParaRPr lang="en-US">
               <a:solidFill>
@@ -20970,7 +21022,7 @@
                 <a:latin typeface="Segoe UI"/>
               </a:rPr>
               <a:pPr/>
-              <a:t>7/7/16</a:t>
+              <a:t>7/12/16</a:t>
             </a:fld>
             <a:endParaRPr lang="en-US">
               <a:solidFill>
@@ -21175,7 +21227,7 @@
                 <a:latin typeface="Segoe UI"/>
               </a:rPr>
               <a:pPr/>
-              <a:t>7/7/16</a:t>
+              <a:t>7/12/16</a:t>
             </a:fld>
             <a:endParaRPr lang="en-US">
               <a:solidFill>
@@ -21390,7 +21442,7 @@
                 <a:latin typeface="Segoe UI"/>
               </a:rPr>
               <a:pPr/>
-              <a:t>7/7/16</a:t>
+              <a:t>7/12/16</a:t>
             </a:fld>
             <a:endParaRPr lang="en-US">
               <a:solidFill>
@@ -23075,7 +23127,7 @@
                 <a:latin typeface="Segoe UI"/>
               </a:rPr>
               <a:pPr/>
-              <a:t>7/7/16</a:t>
+              <a:t>7/12/16</a:t>
             </a:fld>
             <a:endParaRPr lang="en-US">
               <a:solidFill>
@@ -23655,7 +23707,7 @@
                 <a:latin typeface="Segoe UI"/>
               </a:rPr>
               <a:pPr/>
-              <a:t>7/7/16</a:t>
+              <a:t>7/12/16</a:t>
             </a:fld>
             <a:endParaRPr lang="en-US">
               <a:solidFill>
@@ -26723,21 +26775,21 @@
                 <a:gridCol w="2192867">
                   <a:extLst>
                     <a:ext uri="{9D8B030D-6E8A-4147-A177-3AD203B41FA5}">
-                      <a16:colId xmlns="" xmlns:a16="http://schemas.microsoft.com/office/drawing/2014/main" val="48614039"/>
+                      <a16:colId xmlns:a16="http://schemas.microsoft.com/office/drawing/2014/main" xmlns="" val="48614039"/>
                     </a:ext>
                   </a:extLst>
                 </a:gridCol>
                 <a:gridCol w="4135584">
                   <a:extLst>
                     <a:ext uri="{9D8B030D-6E8A-4147-A177-3AD203B41FA5}">
-                      <a16:colId xmlns="" xmlns:a16="http://schemas.microsoft.com/office/drawing/2014/main" val="2691826141"/>
+                      <a16:colId xmlns:a16="http://schemas.microsoft.com/office/drawing/2014/main" xmlns="" val="2691826141"/>
                     </a:ext>
                   </a:extLst>
                 </a:gridCol>
                 <a:gridCol w="4398816">
                   <a:extLst>
                     <a:ext uri="{9D8B030D-6E8A-4147-A177-3AD203B41FA5}">
-                      <a16:colId xmlns="" xmlns:a16="http://schemas.microsoft.com/office/drawing/2014/main" val="740133587"/>
+                      <a16:colId xmlns:a16="http://schemas.microsoft.com/office/drawing/2014/main" xmlns="" val="740133587"/>
                     </a:ext>
                   </a:extLst>
                 </a:gridCol>
@@ -26819,7 +26871,7 @@
                 </a:tc>
                 <a:extLst>
                   <a:ext uri="{0D108BD9-81ED-4DB2-BD59-A6C34878D82A}">
-                    <a16:rowId xmlns="" xmlns:a16="http://schemas.microsoft.com/office/drawing/2014/main" val="679667022"/>
+                    <a16:rowId xmlns:a16="http://schemas.microsoft.com/office/drawing/2014/main" xmlns="" val="679667022"/>
                   </a:ext>
                 </a:extLst>
               </a:tr>
@@ -26893,7 +26945,7 @@
                 </a:tc>
                 <a:extLst>
                   <a:ext uri="{0D108BD9-81ED-4DB2-BD59-A6C34878D82A}">
-                    <a16:rowId xmlns="" xmlns:a16="http://schemas.microsoft.com/office/drawing/2014/main" val="2034482246"/>
+                    <a16:rowId xmlns:a16="http://schemas.microsoft.com/office/drawing/2014/main" xmlns="" val="2034482246"/>
                   </a:ext>
                 </a:extLst>
               </a:tr>
@@ -26983,7 +27035,7 @@
                 </a:tc>
                 <a:extLst>
                   <a:ext uri="{0D108BD9-81ED-4DB2-BD59-A6C34878D82A}">
-                    <a16:rowId xmlns="" xmlns:a16="http://schemas.microsoft.com/office/drawing/2014/main" val="682465758"/>
+                    <a16:rowId xmlns:a16="http://schemas.microsoft.com/office/drawing/2014/main" xmlns="" val="682465758"/>
                   </a:ext>
                 </a:extLst>
               </a:tr>
@@ -27050,7 +27102,7 @@
                 </a:tc>
                 <a:extLst>
                   <a:ext uri="{0D108BD9-81ED-4DB2-BD59-A6C34878D82A}">
-                    <a16:rowId xmlns="" xmlns:a16="http://schemas.microsoft.com/office/drawing/2014/main" val="4230228483"/>
+                    <a16:rowId xmlns:a16="http://schemas.microsoft.com/office/drawing/2014/main" xmlns="" val="4230228483"/>
                   </a:ext>
                 </a:extLst>
               </a:tr>
@@ -27117,7 +27169,7 @@
                 </a:tc>
                 <a:extLst>
                   <a:ext uri="{0D108BD9-81ED-4DB2-BD59-A6C34878D82A}">
-                    <a16:rowId xmlns="" xmlns:a16="http://schemas.microsoft.com/office/drawing/2014/main" val="3329658239"/>
+                    <a16:rowId xmlns:a16="http://schemas.microsoft.com/office/drawing/2014/main" xmlns="" val="3329658239"/>
                   </a:ext>
                 </a:extLst>
               </a:tr>
@@ -27184,7 +27236,7 @@
                 </a:tc>
                 <a:extLst>
                   <a:ext uri="{0D108BD9-81ED-4DB2-BD59-A6C34878D82A}">
-                    <a16:rowId xmlns="" xmlns:a16="http://schemas.microsoft.com/office/drawing/2014/main" val="10005"/>
+                    <a16:rowId xmlns:a16="http://schemas.microsoft.com/office/drawing/2014/main" xmlns="" val="10005"/>
                   </a:ext>
                 </a:extLst>
               </a:tr>
@@ -30247,42 +30299,42 @@
                 <a:gridCol w="1947333">
                   <a:extLst>
                     <a:ext uri="{9D8B030D-6E8A-4147-A177-3AD203B41FA5}">
-                      <a16:colId xmlns="" xmlns:a16="http://schemas.microsoft.com/office/drawing/2014/main" val="48614039"/>
+                      <a16:colId xmlns:a16="http://schemas.microsoft.com/office/drawing/2014/main" xmlns="" val="48614039"/>
                     </a:ext>
                   </a:extLst>
                 </a:gridCol>
                 <a:gridCol w="1742998">
                   <a:extLst>
                     <a:ext uri="{9D8B030D-6E8A-4147-A177-3AD203B41FA5}">
-                      <a16:colId xmlns="" xmlns:a16="http://schemas.microsoft.com/office/drawing/2014/main" val="2691826141"/>
+                      <a16:colId xmlns:a16="http://schemas.microsoft.com/office/drawing/2014/main" xmlns="" val="2691826141"/>
                     </a:ext>
                   </a:extLst>
                 </a:gridCol>
                 <a:gridCol w="1761495">
                   <a:extLst>
                     <a:ext uri="{9D8B030D-6E8A-4147-A177-3AD203B41FA5}">
-                      <a16:colId xmlns="" xmlns:a16="http://schemas.microsoft.com/office/drawing/2014/main" val="740133587"/>
+                      <a16:colId xmlns:a16="http://schemas.microsoft.com/office/drawing/2014/main" xmlns="" val="740133587"/>
                     </a:ext>
                   </a:extLst>
                 </a:gridCol>
                 <a:gridCol w="1955259">
                   <a:extLst>
                     <a:ext uri="{9D8B030D-6E8A-4147-A177-3AD203B41FA5}">
-                      <a16:colId xmlns="" xmlns:a16="http://schemas.microsoft.com/office/drawing/2014/main" val="319957056"/>
+                      <a16:colId xmlns:a16="http://schemas.microsoft.com/office/drawing/2014/main" xmlns="" val="319957056"/>
                     </a:ext>
                   </a:extLst>
                 </a:gridCol>
                 <a:gridCol w="1884798">
                   <a:extLst>
                     <a:ext uri="{9D8B030D-6E8A-4147-A177-3AD203B41FA5}">
-                      <a16:colId xmlns="" xmlns:a16="http://schemas.microsoft.com/office/drawing/2014/main" val="3087108132"/>
+                      <a16:colId xmlns:a16="http://schemas.microsoft.com/office/drawing/2014/main" xmlns="" val="3087108132"/>
                     </a:ext>
                   </a:extLst>
                 </a:gridCol>
                 <a:gridCol w="1867186">
                   <a:extLst>
                     <a:ext uri="{9D8B030D-6E8A-4147-A177-3AD203B41FA5}">
-                      <a16:colId xmlns="" xmlns:a16="http://schemas.microsoft.com/office/drawing/2014/main" val="3897417586"/>
+                      <a16:colId xmlns:a16="http://schemas.microsoft.com/office/drawing/2014/main" xmlns="" val="3897417586"/>
                     </a:ext>
                   </a:extLst>
                 </a:gridCol>
@@ -30472,7 +30524,7 @@
                 </a:tc>
                 <a:extLst>
                   <a:ext uri="{0D108BD9-81ED-4DB2-BD59-A6C34878D82A}">
-                    <a16:rowId xmlns="" xmlns:a16="http://schemas.microsoft.com/office/drawing/2014/main" val="679667022"/>
+                    <a16:rowId xmlns:a16="http://schemas.microsoft.com/office/drawing/2014/main" xmlns="" val="679667022"/>
                   </a:ext>
                 </a:extLst>
               </a:tr>
@@ -30671,7 +30723,7 @@
                 </a:tc>
                 <a:extLst>
                   <a:ext uri="{0D108BD9-81ED-4DB2-BD59-A6C34878D82A}">
-                    <a16:rowId xmlns="" xmlns:a16="http://schemas.microsoft.com/office/drawing/2014/main" val="2034482246"/>
+                    <a16:rowId xmlns:a16="http://schemas.microsoft.com/office/drawing/2014/main" xmlns="" val="2034482246"/>
                   </a:ext>
                 </a:extLst>
               </a:tr>
@@ -30885,7 +30937,7 @@
                 </a:tc>
                 <a:extLst>
                   <a:ext uri="{0D108BD9-81ED-4DB2-BD59-A6C34878D82A}">
-                    <a16:rowId xmlns="" xmlns:a16="http://schemas.microsoft.com/office/drawing/2014/main" val="682465758"/>
+                    <a16:rowId xmlns:a16="http://schemas.microsoft.com/office/drawing/2014/main" xmlns="" val="682465758"/>
                   </a:ext>
                 </a:extLst>
               </a:tr>
@@ -35795,7 +35847,7 @@
   <a:extraClrSchemeLst/>
   <a:extLst>
     <a:ext uri="{05A4C25C-085E-4340-85A3-A5531E510DB2}">
-      <thm15:themeFamily xmlns:thm15="http://schemas.microsoft.com/office/thememl/2012/main" xmlns="" name="Azure4ResearchTemplate" id="{DD1C6CE8-BDBA-0D4F-9930-3643ABC8EF0E}" vid="{B5C66FD7-0952-994B-96D6-AB3BB89097FE}"/>
+      <thm15:themeFamily xmlns="" xmlns:thm15="http://schemas.microsoft.com/office/thememl/2012/main" name="Azure4ResearchTemplate" id="{DD1C6CE8-BDBA-0D4F-9930-3643ABC8EF0E}" vid="{B5C66FD7-0952-994B-96D6-AB3BB89097FE}"/>
     </a:ext>
   </a:extLst>
 </a:theme>
@@ -36064,7 +36116,7 @@
   <a:extraClrSchemeLst/>
   <a:extLst>
     <a:ext uri="{05A4C25C-085E-4340-85A3-A5531E510DB2}">
-      <thm15:themeFamily xmlns:thm15="http://schemas.microsoft.com/office/thememl/2012/main" xmlns="" name="Office Theme" id="{62F939B6-93AF-4DB8-9C6B-D6C7DFDC589F}" vid="{4A3C46E8-61CC-4603-A589-7422A47A8E4A}"/>
+      <thm15:themeFamily xmlns="" xmlns:thm15="http://schemas.microsoft.com/office/thememl/2012/main" name="Office Theme" id="{62F939B6-93AF-4DB8-9C6B-D6C7DFDC589F}" vid="{4A3C46E8-61CC-4603-A589-7422A47A8E4A}"/>
     </a:ext>
   </a:extLst>
 </a:theme>
@@ -36333,7 +36385,7 @@
   <a:extraClrSchemeLst/>
   <a:extLst>
     <a:ext uri="{05A4C25C-085E-4340-85A3-A5531E510DB2}">
-      <thm15:themeFamily xmlns:thm15="http://schemas.microsoft.com/office/thememl/2012/main" xmlns="" name="Office Theme" id="{62F939B6-93AF-4DB8-9C6B-D6C7DFDC589F}" vid="{4A3C46E8-61CC-4603-A589-7422A47A8E4A}"/>
+      <thm15:themeFamily xmlns="" xmlns:thm15="http://schemas.microsoft.com/office/thememl/2012/main" name="Office Theme" id="{62F939B6-93AF-4DB8-9C6B-D6C7DFDC589F}" vid="{4A3C46E8-61CC-4603-A589-7422A47A8E4A}"/>
     </a:ext>
   </a:extLst>
 </a:theme>
@@ -36594,7 +36646,7 @@
   <a:extraClrSchemeLst/>
   <a:extLst>
     <a:ext uri="{05A4C25C-085E-4340-85A3-A5531E510DB2}">
-      <thm15:themeFamily xmlns:thm15="http://schemas.microsoft.com/office/thememl/2012/main" xmlns="" name="Office Theme" id="{62F939B6-93AF-4DB8-9C6B-D6C7DFDC589F}" vid="{4A3C46E8-61CC-4603-A589-7422A47A8E4A}"/>
+      <thm15:themeFamily xmlns="" xmlns:thm15="http://schemas.microsoft.com/office/thememl/2012/main" name="Office Theme" id="{62F939B6-93AF-4DB8-9C6B-D6C7DFDC589F}" vid="{4A3C46E8-61CC-4603-A589-7422A47A8E4A}"/>
     </a:ext>
   </a:extLst>
 </a:theme>
@@ -36889,7 +36941,7 @@
   <a:extraClrSchemeLst/>
   <a:extLst>
     <a:ext uri="{05A4C25C-085E-4340-85A3-A5531E510DB2}">
-      <thm15:themeFamily xmlns:thm15="http://schemas.microsoft.com/office/thememl/2012/main" xmlns="" name="Office Theme" id="{62F939B6-93AF-4DB8-9C6B-D6C7DFDC589F}" vid="{4A3C46E8-61CC-4603-A589-7422A47A8E4A}"/>
+      <thm15:themeFamily xmlns="" xmlns:thm15="http://schemas.microsoft.com/office/thememl/2012/main" name="Office Theme" id="{62F939B6-93AF-4DB8-9C6B-D6C7DFDC589F}" vid="{4A3C46E8-61CC-4603-A589-7422A47A8E4A}"/>
     </a:ext>
   </a:extLst>
 </a:theme>

</xml_diff>